<commit_message>
Applying some ideas and improvements from SN
</commit_message>
<xml_diff>
--- a/Documentation/Défense/Shoot4stats.pptx
+++ b/Documentation/Défense/Shoot4stats.pptx
@@ -108,6 +108,11 @@
       </a:defRPr>
     </a:lvl9pPr>
   </p:defaultTextStyle>
+  <p:extLst>
+    <p:ext uri="{EFAFB233-063F-42B5-8137-9DF3F51BA10A}">
+      <p15:sldGuideLst xmlns:p15="http://schemas.microsoft.com/office/powerpoint/2012/main"/>
+    </p:ext>
+  </p:extLst>
 </p:presentation>
 </file>
 
@@ -297,7 +302,7 @@
           <a:p>
             <a:fld id="{48A87A34-81AB-432B-8DAE-1953F412C126}" type="datetimeFigureOut">
               <a:rPr lang="en-US" smtClean="0"/>
-              <a:t>4/19/2017</a:t>
+              <a:t>4/24/2017</a:t>
             </a:fld>
             <a:endParaRPr lang="en-US" dirty="0"/>
           </a:p>
@@ -573,7 +578,7 @@
             <a:fld id="{48A87A34-81AB-432B-8DAE-1953F412C126}" type="datetimeFigureOut">
               <a:rPr lang="en-US" smtClean="0"/>
               <a:pPr/>
-              <a:t>4/19/2017</a:t>
+              <a:t>4/24/2017</a:t>
             </a:fld>
             <a:endParaRPr lang="en-US" dirty="0"/>
           </a:p>
@@ -769,7 +774,7 @@
             <a:fld id="{48A87A34-81AB-432B-8DAE-1953F412C126}" type="datetimeFigureOut">
               <a:rPr lang="en-US" smtClean="0"/>
               <a:pPr/>
-              <a:t>4/19/2017</a:t>
+              <a:t>4/24/2017</a:t>
             </a:fld>
             <a:endParaRPr lang="en-US" dirty="0"/>
           </a:p>
@@ -1044,7 +1049,7 @@
             <a:fld id="{48A87A34-81AB-432B-8DAE-1953F412C126}" type="datetimeFigureOut">
               <a:rPr lang="en-US" smtClean="0"/>
               <a:pPr/>
-              <a:t>4/19/2017</a:t>
+              <a:t>4/24/2017</a:t>
             </a:fld>
             <a:endParaRPr lang="en-US" dirty="0"/>
           </a:p>
@@ -1387,7 +1392,7 @@
             <a:fld id="{48A87A34-81AB-432B-8DAE-1953F412C126}" type="datetimeFigureOut">
               <a:rPr lang="en-US" smtClean="0"/>
               <a:pPr/>
-              <a:t>4/19/2017</a:t>
+              <a:t>4/24/2017</a:t>
             </a:fld>
             <a:endParaRPr lang="en-US" dirty="0"/>
           </a:p>
@@ -2012,7 +2017,7 @@
             <a:fld id="{48A87A34-81AB-432B-8DAE-1953F412C126}" type="datetimeFigureOut">
               <a:rPr lang="en-US" smtClean="0"/>
               <a:pPr/>
-              <a:t>4/19/2017</a:t>
+              <a:t>4/24/2017</a:t>
             </a:fld>
             <a:endParaRPr lang="en-US" dirty="0"/>
           </a:p>
@@ -2874,7 +2879,7 @@
             <a:fld id="{48A87A34-81AB-432B-8DAE-1953F412C126}" type="datetimeFigureOut">
               <a:rPr lang="en-US" smtClean="0"/>
               <a:pPr/>
-              <a:t>4/19/2017</a:t>
+              <a:t>4/24/2017</a:t>
             </a:fld>
             <a:endParaRPr lang="en-US" dirty="0"/>
           </a:p>
@@ -3045,7 +3050,7 @@
           <a:p>
             <a:fld id="{48A87A34-81AB-432B-8DAE-1953F412C126}" type="datetimeFigureOut">
               <a:rPr lang="en-US" smtClean="0"/>
-              <a:t>4/19/2017</a:t>
+              <a:t>4/24/2017</a:t>
             </a:fld>
             <a:endParaRPr lang="en-US" dirty="0"/>
           </a:p>
@@ -3225,7 +3230,7 @@
           <a:p>
             <a:fld id="{48A87A34-81AB-432B-8DAE-1953F412C126}" type="datetimeFigureOut">
               <a:rPr lang="en-US" smtClean="0"/>
-              <a:t>4/19/2017</a:t>
+              <a:t>4/24/2017</a:t>
             </a:fld>
             <a:endParaRPr lang="en-US" dirty="0"/>
           </a:p>
@@ -3395,7 +3400,7 @@
           <a:p>
             <a:fld id="{48A87A34-81AB-432B-8DAE-1953F412C126}" type="datetimeFigureOut">
               <a:rPr lang="en-US" smtClean="0"/>
-              <a:t>4/19/2017</a:t>
+              <a:t>4/24/2017</a:t>
             </a:fld>
             <a:endParaRPr lang="en-US" dirty="0"/>
           </a:p>
@@ -3642,7 +3647,7 @@
           <a:p>
             <a:fld id="{48A87A34-81AB-432B-8DAE-1953F412C126}" type="datetimeFigureOut">
               <a:rPr lang="en-US" smtClean="0"/>
-              <a:t>4/19/2017</a:t>
+              <a:t>4/24/2017</a:t>
             </a:fld>
             <a:endParaRPr lang="en-US" dirty="0"/>
           </a:p>
@@ -3934,7 +3939,7 @@
           <a:p>
             <a:fld id="{48A87A34-81AB-432B-8DAE-1953F412C126}" type="datetimeFigureOut">
               <a:rPr lang="en-US" smtClean="0"/>
-              <a:t>4/19/2017</a:t>
+              <a:t>4/24/2017</a:t>
             </a:fld>
             <a:endParaRPr lang="en-US" dirty="0"/>
           </a:p>
@@ -4378,7 +4383,7 @@
           <a:p>
             <a:fld id="{48A87A34-81AB-432B-8DAE-1953F412C126}" type="datetimeFigureOut">
               <a:rPr lang="en-US" smtClean="0"/>
-              <a:t>4/19/2017</a:t>
+              <a:t>4/24/2017</a:t>
             </a:fld>
             <a:endParaRPr lang="en-US" dirty="0"/>
           </a:p>
@@ -4496,7 +4501,7 @@
           <a:p>
             <a:fld id="{48A87A34-81AB-432B-8DAE-1953F412C126}" type="datetimeFigureOut">
               <a:rPr lang="en-US" smtClean="0"/>
-              <a:t>4/19/2017</a:t>
+              <a:t>4/24/2017</a:t>
             </a:fld>
             <a:endParaRPr lang="en-US" dirty="0"/>
           </a:p>
@@ -4591,7 +4596,7 @@
           <a:p>
             <a:fld id="{48A87A34-81AB-432B-8DAE-1953F412C126}" type="datetimeFigureOut">
               <a:rPr lang="en-US" smtClean="0"/>
-              <a:t>4/19/2017</a:t>
+              <a:t>4/24/2017</a:t>
             </a:fld>
             <a:endParaRPr lang="en-US" dirty="0"/>
           </a:p>
@@ -4870,7 +4875,7 @@
           <a:p>
             <a:fld id="{48A87A34-81AB-432B-8DAE-1953F412C126}" type="datetimeFigureOut">
               <a:rPr lang="en-US" smtClean="0"/>
-              <a:t>4/19/2017</a:t>
+              <a:t>4/24/2017</a:t>
             </a:fld>
             <a:endParaRPr lang="en-US" dirty="0"/>
           </a:p>
@@ -5145,7 +5150,7 @@
           <a:p>
             <a:fld id="{48A87A34-81AB-432B-8DAE-1953F412C126}" type="datetimeFigureOut">
               <a:rPr lang="en-US" smtClean="0"/>
-              <a:t>4/19/2017</a:t>
+              <a:t>4/24/2017</a:t>
             </a:fld>
             <a:endParaRPr lang="en-US" dirty="0"/>
           </a:p>
@@ -5575,7 +5580,7 @@
             <a:fld id="{48A87A34-81AB-432B-8DAE-1953F412C126}" type="datetimeFigureOut">
               <a:rPr lang="en-US" smtClean="0"/>
               <a:pPr/>
-              <a:t>4/19/2017</a:t>
+              <a:t>4/24/2017</a:t>
             </a:fld>
             <a:endParaRPr lang="en-US" dirty="0"/>
           </a:p>
@@ -6358,15 +6363,15 @@
         </p:nvCxnSpPr>
         <p:spPr>
           <a:xfrm>
-            <a:off x="6767384" y="1742303"/>
-            <a:ext cx="531342" cy="547815"/>
+            <a:off x="6767384" y="2019302"/>
+            <a:ext cx="531342" cy="270816"/>
           </a:xfrm>
           <a:prstGeom prst="straightConnector1">
             <a:avLst/>
           </a:prstGeom>
           <a:ln>
             <a:solidFill>
-              <a:srgbClr val="026E00"/>
+              <a:schemeClr val="accent1"/>
             </a:solidFill>
             <a:tailEnd type="triangle"/>
           </a:ln>
@@ -6395,7 +6400,7 @@
         <p:spPr>
           <a:xfrm>
             <a:off x="5914767" y="1372971"/>
-            <a:ext cx="1705233" cy="369332"/>
+            <a:ext cx="1705233" cy="646331"/>
           </a:xfrm>
           <a:prstGeom prst="rect">
             <a:avLst/>
@@ -6411,14 +6416,14 @@
             <a:r>
               <a:rPr lang="en-US" dirty="0" smtClean="0">
                 <a:solidFill>
-                  <a:srgbClr val="026E00"/>
+                  <a:schemeClr val="accent1"/>
                 </a:solidFill>
               </a:rPr>
               <a:t>Node.JS execute</a:t>
             </a:r>
             <a:endParaRPr lang="fr-CH" dirty="0">
               <a:solidFill>
-                <a:srgbClr val="026E00"/>
+                <a:schemeClr val="accent1"/>
               </a:solidFill>
             </a:endParaRPr>
           </a:p>
@@ -7203,7 +7208,7 @@
       </p:sp>
       <p:pic>
         <p:nvPicPr>
-          <p:cNvPr id="4" name="Picture 3"/>
+          <p:cNvPr id="3" name="Picture 2"/>
           <p:cNvPicPr>
             <a:picLocks noChangeAspect="1"/>
           </p:cNvPicPr>
@@ -7217,8 +7222,8 @@
         </p:blipFill>
         <p:spPr>
           <a:xfrm>
-            <a:off x="2035087" y="1069095"/>
-            <a:ext cx="7364285" cy="5576955"/>
+            <a:off x="3212757" y="1018677"/>
+            <a:ext cx="7160228" cy="5839323"/>
           </a:xfrm>
           <a:prstGeom prst="rect">
             <a:avLst/>

</xml_diff>